<commit_message>
updated slides, uploaded clean version
</commit_message>
<xml_diff>
--- a/springBootDataWorkshop.pptx
+++ b/springBootDataWorkshop.pptx
@@ -6,10 +6,10 @@
     <p:sldMasterId id="2147493481" r:id="rId5"/>
   </p:sldMasterIdLst>
   <p:notesMasterIdLst>
-    <p:notesMasterId r:id="rId25"/>
+    <p:notesMasterId r:id="rId23"/>
   </p:notesMasterIdLst>
   <p:handoutMasterIdLst>
-    <p:handoutMasterId r:id="rId26"/>
+    <p:handoutMasterId r:id="rId24"/>
   </p:handoutMasterIdLst>
   <p:sldIdLst>
     <p:sldId id="262" r:id="rId6"/>
@@ -17,23 +17,21 @@
     <p:sldId id="265" r:id="rId8"/>
     <p:sldId id="267" r:id="rId9"/>
     <p:sldId id="266" r:id="rId10"/>
-    <p:sldId id="268" r:id="rId11"/>
+    <p:sldId id="282" r:id="rId11"/>
     <p:sldId id="281" r:id="rId12"/>
-    <p:sldId id="279" r:id="rId13"/>
-    <p:sldId id="270" r:id="rId14"/>
-    <p:sldId id="269" r:id="rId15"/>
+    <p:sldId id="270" r:id="rId13"/>
+    <p:sldId id="269" r:id="rId14"/>
+    <p:sldId id="272" r:id="rId15"/>
     <p:sldId id="278" r:id="rId16"/>
-    <p:sldId id="272" r:id="rId17"/>
-    <p:sldId id="274" r:id="rId18"/>
-    <p:sldId id="271" r:id="rId19"/>
-    <p:sldId id="275" r:id="rId20"/>
-    <p:sldId id="273" r:id="rId21"/>
-    <p:sldId id="277" r:id="rId22"/>
-    <p:sldId id="276" r:id="rId23"/>
-    <p:sldId id="280" r:id="rId24"/>
+    <p:sldId id="271" r:id="rId17"/>
+    <p:sldId id="275" r:id="rId18"/>
+    <p:sldId id="273" r:id="rId19"/>
+    <p:sldId id="277" r:id="rId20"/>
+    <p:sldId id="276" r:id="rId21"/>
+    <p:sldId id="280" r:id="rId22"/>
   </p:sldIdLst>
   <p:sldSz cx="9144000" cy="5143500" type="screen16x9"/>
-  <p:notesSz cx="6858000" cy="9144000"/>
+  <p:notesSz cx="6881813" cy="9661525"/>
   <p:defaultTextStyle>
     <a:defPPr>
       <a:defRPr lang="en-US"/>
@@ -187,14 +185,14 @@
         <p:spPr>
           <a:xfrm>
             <a:off x="0" y="0"/>
-            <a:ext cx="2971800" cy="457200"/>
+            <a:ext cx="2982119" cy="483076"/>
           </a:xfrm>
           <a:prstGeom prst="rect">
             <a:avLst/>
           </a:prstGeom>
         </p:spPr>
         <p:txBody>
-          <a:bodyPr vert="horz" lIns="91440" tIns="45720" rIns="91440" bIns="45720" rtlCol="0"/>
+          <a:bodyPr vert="horz" lIns="94531" tIns="47265" rIns="94531" bIns="47265" rtlCol="0"/>
           <a:lstStyle>
             <a:lvl1pPr algn="l">
               <a:defRPr sz="1200"/>
@@ -217,15 +215,15 @@
         </p:nvSpPr>
         <p:spPr>
           <a:xfrm>
-            <a:off x="3884613" y="0"/>
-            <a:ext cx="2971800" cy="457200"/>
+            <a:off x="3898102" y="0"/>
+            <a:ext cx="2982119" cy="483076"/>
           </a:xfrm>
           <a:prstGeom prst="rect">
             <a:avLst/>
           </a:prstGeom>
         </p:spPr>
         <p:txBody>
-          <a:bodyPr vert="horz" lIns="91440" tIns="45720" rIns="91440" bIns="45720" rtlCol="0"/>
+          <a:bodyPr vert="horz" lIns="94531" tIns="47265" rIns="94531" bIns="47265" rtlCol="0"/>
           <a:lstStyle>
             <a:lvl1pPr algn="r">
               <a:defRPr sz="1200"/>
@@ -234,7 +232,7 @@
           <a:p>
             <a:fld id="{1869EC12-32BB-B84B-964B-77CD8A6EA5B5}" type="datetimeFigureOut">
               <a:rPr lang="de-DE" smtClean="0"/>
-              <a:t>13.05.2017</a:t>
+              <a:t>20.05.2017</a:t>
             </a:fld>
             <a:endParaRPr lang="de-DE" dirty="0"/>
           </a:p>
@@ -252,15 +250,15 @@
         </p:nvSpPr>
         <p:spPr>
           <a:xfrm>
-            <a:off x="0" y="8685213"/>
-            <a:ext cx="2971800" cy="457200"/>
+            <a:off x="0" y="9176772"/>
+            <a:ext cx="2982119" cy="483076"/>
           </a:xfrm>
           <a:prstGeom prst="rect">
             <a:avLst/>
           </a:prstGeom>
         </p:spPr>
         <p:txBody>
-          <a:bodyPr vert="horz" lIns="91440" tIns="45720" rIns="91440" bIns="45720" rtlCol="0" anchor="b"/>
+          <a:bodyPr vert="horz" lIns="94531" tIns="47265" rIns="94531" bIns="47265" rtlCol="0" anchor="b"/>
           <a:lstStyle>
             <a:lvl1pPr algn="l">
               <a:defRPr sz="1200"/>
@@ -283,15 +281,15 @@
         </p:nvSpPr>
         <p:spPr>
           <a:xfrm>
-            <a:off x="3884613" y="8685213"/>
-            <a:ext cx="2971800" cy="457200"/>
+            <a:off x="3898102" y="9176772"/>
+            <a:ext cx="2982119" cy="483076"/>
           </a:xfrm>
           <a:prstGeom prst="rect">
             <a:avLst/>
           </a:prstGeom>
         </p:spPr>
         <p:txBody>
-          <a:bodyPr vert="horz" lIns="91440" tIns="45720" rIns="91440" bIns="45720" rtlCol="0" anchor="b"/>
+          <a:bodyPr vert="horz" lIns="94531" tIns="47265" rIns="94531" bIns="47265" rtlCol="0" anchor="b"/>
           <a:lstStyle>
             <a:lvl1pPr algn="r">
               <a:defRPr sz="1200"/>
@@ -353,14 +351,14 @@
         <p:spPr>
           <a:xfrm>
             <a:off x="0" y="0"/>
-            <a:ext cx="2971800" cy="457200"/>
+            <a:ext cx="2982119" cy="483076"/>
           </a:xfrm>
           <a:prstGeom prst="rect">
             <a:avLst/>
           </a:prstGeom>
         </p:spPr>
         <p:txBody>
-          <a:bodyPr vert="horz" lIns="91440" tIns="45720" rIns="91440" bIns="45720" rtlCol="0"/>
+          <a:bodyPr vert="horz" lIns="94531" tIns="47265" rIns="94531" bIns="47265" rtlCol="0"/>
           <a:lstStyle>
             <a:lvl1pPr algn="l">
               <a:defRPr sz="1200"/>
@@ -383,15 +381,15 @@
         </p:nvSpPr>
         <p:spPr>
           <a:xfrm>
-            <a:off x="3884613" y="0"/>
-            <a:ext cx="2971800" cy="457200"/>
+            <a:off x="3898102" y="0"/>
+            <a:ext cx="2982119" cy="483076"/>
           </a:xfrm>
           <a:prstGeom prst="rect">
             <a:avLst/>
           </a:prstGeom>
         </p:spPr>
         <p:txBody>
-          <a:bodyPr vert="horz" lIns="91440" tIns="45720" rIns="91440" bIns="45720" rtlCol="0"/>
+          <a:bodyPr vert="horz" lIns="94531" tIns="47265" rIns="94531" bIns="47265" rtlCol="0"/>
           <a:lstStyle>
             <a:lvl1pPr algn="r">
               <a:defRPr sz="1200"/>
@@ -400,7 +398,7 @@
           <a:p>
             <a:fld id="{396D8CEF-220A-EC43-8099-BAE7D65DBE3D}" type="datetimeFigureOut">
               <a:rPr lang="de-DE" smtClean="0"/>
-              <a:t>13.05.2017</a:t>
+              <a:t>20.05.2017</a:t>
             </a:fld>
             <a:endParaRPr lang="de-DE" dirty="0"/>
           </a:p>
@@ -418,8 +416,8 @@
         </p:nvSpPr>
         <p:spPr>
           <a:xfrm>
-            <a:off x="381000" y="685800"/>
-            <a:ext cx="6096000" cy="3429000"/>
+            <a:off x="220663" y="723900"/>
+            <a:ext cx="6440487" cy="3624263"/>
           </a:xfrm>
           <a:prstGeom prst="rect">
             <a:avLst/>
@@ -432,7 +430,7 @@
           </a:ln>
         </p:spPr>
         <p:txBody>
-          <a:bodyPr vert="horz" lIns="91440" tIns="45720" rIns="91440" bIns="45720" rtlCol="0" anchor="ctr"/>
+          <a:bodyPr vert="horz" lIns="94531" tIns="47265" rIns="94531" bIns="47265" rtlCol="0" anchor="ctr"/>
           <a:lstStyle/>
           <a:p>
             <a:endParaRPr lang="de-DE" dirty="0"/>
@@ -451,15 +449,15 @@
         </p:nvSpPr>
         <p:spPr>
           <a:xfrm>
-            <a:off x="685800" y="4343400"/>
-            <a:ext cx="5486400" cy="4114800"/>
+            <a:off x="688182" y="4589225"/>
+            <a:ext cx="5505450" cy="4347686"/>
           </a:xfrm>
           <a:prstGeom prst="rect">
             <a:avLst/>
           </a:prstGeom>
         </p:spPr>
         <p:txBody>
-          <a:bodyPr vert="horz" lIns="91440" tIns="45720" rIns="91440" bIns="45720" rtlCol="0"/>
+          <a:bodyPr vert="horz" lIns="94531" tIns="47265" rIns="94531" bIns="47265" rtlCol="0"/>
           <a:lstStyle/>
           <a:p>
             <a:pPr lvl="0"/>
@@ -510,15 +508,15 @@
         </p:nvSpPr>
         <p:spPr>
           <a:xfrm>
-            <a:off x="0" y="8685213"/>
-            <a:ext cx="2971800" cy="457200"/>
+            <a:off x="0" y="9176772"/>
+            <a:ext cx="2982119" cy="483076"/>
           </a:xfrm>
           <a:prstGeom prst="rect">
             <a:avLst/>
           </a:prstGeom>
         </p:spPr>
         <p:txBody>
-          <a:bodyPr vert="horz" lIns="91440" tIns="45720" rIns="91440" bIns="45720" rtlCol="0" anchor="b"/>
+          <a:bodyPr vert="horz" lIns="94531" tIns="47265" rIns="94531" bIns="47265" rtlCol="0" anchor="b"/>
           <a:lstStyle>
             <a:lvl1pPr algn="l">
               <a:defRPr sz="1200"/>
@@ -541,15 +539,15 @@
         </p:nvSpPr>
         <p:spPr>
           <a:xfrm>
-            <a:off x="3884613" y="8685213"/>
-            <a:ext cx="2971800" cy="457200"/>
+            <a:off x="3898102" y="9176772"/>
+            <a:ext cx="2982119" cy="483076"/>
           </a:xfrm>
           <a:prstGeom prst="rect">
             <a:avLst/>
           </a:prstGeom>
         </p:spPr>
         <p:txBody>
-          <a:bodyPr vert="horz" lIns="91440" tIns="45720" rIns="91440" bIns="45720" rtlCol="0" anchor="b"/>
+          <a:bodyPr vert="horz" lIns="94531" tIns="47265" rIns="94531" bIns="47265" rtlCol="0" anchor="b"/>
           <a:lstStyle>
             <a:lvl1pPr algn="r">
               <a:defRPr sz="1200"/>
@@ -5700,8 +5698,8 @@
           <a:lstStyle/>
           <a:p>
             <a:r>
-              <a:rPr lang="en-US" dirty="0"/>
-              <a:t>30 min</a:t>
+              <a:rPr lang="de-DE" dirty="0"/>
+              <a:t>15 min</a:t>
             </a:r>
             <a:endParaRPr lang="en-GB" dirty="0"/>
           </a:p>
@@ -5766,22 +5764,12 @@
         </p:nvSpPr>
         <p:spPr/>
         <p:txBody>
-          <a:bodyPr>
-            <a:normAutofit/>
-          </a:bodyPr>
-          <a:lstStyle/>
-          <a:p>
-            <a:r>
-              <a:rPr lang="de-DE" dirty="0"/>
-              <a:t>Event Repository </a:t>
-            </a:r>
-            <a:r>
-              <a:rPr lang="de-DE" dirty="0" err="1"/>
-              <a:t>erweiten</a:t>
-            </a:r>
-            <a:r>
-              <a:rPr lang="de-DE" dirty="0"/>
-              <a:t> um Suche</a:t>
+          <a:bodyPr/>
+          <a:lstStyle/>
+          <a:p>
+            <a:r>
+              <a:rPr lang="de-DE" dirty="0"/>
+              <a:t>Neues Repository hinzufügen …</a:t>
             </a:r>
             <a:endParaRPr lang="en-GB" dirty="0"/>
           </a:p>
@@ -5804,24 +5792,21 @@
           <a:p>
             <a:r>
               <a:rPr lang="de-DE" dirty="0"/>
-              <a:t>(danach HAL Browser zeigen, neue </a:t>
-            </a:r>
-            <a:r>
-              <a:rPr lang="de-DE" dirty="0" err="1"/>
-              <a:t>Queries</a:t>
-            </a:r>
-            <a:r>
-              <a:rPr lang="de-DE" dirty="0"/>
-              <a:t> da)</a:t>
-            </a:r>
-            <a:endParaRPr lang="en-GB" dirty="0"/>
+              <a:t>Query: Anzahl alle Speakers von Firma X berechnen</a:t>
+            </a:r>
+          </a:p>
+          <a:p>
+            <a:r>
+              <a:rPr lang="de-DE" dirty="0"/>
+              <a:t>Native Query: Liste von alle eindeutige Firmen</a:t>
+            </a:r>
           </a:p>
         </p:txBody>
       </p:sp>
     </p:spTree>
     <p:extLst>
       <p:ext uri="{BB962C8B-B14F-4D97-AF65-F5344CB8AC3E}">
-        <p14:creationId xmlns:p14="http://schemas.microsoft.com/office/powerpoint/2010/main" val="204088125"/>
+        <p14:creationId xmlns:p14="http://schemas.microsoft.com/office/powerpoint/2010/main" val="2033767423"/>
       </p:ext>
     </p:extLst>
   </p:cSld>
@@ -6009,7 +5994,7 @@
           <a:p>
             <a:r>
               <a:rPr lang="de-DE" dirty="0"/>
-              <a:t>15 min</a:t>
+              <a:t>10 min</a:t>
             </a:r>
             <a:endParaRPr lang="en-GB" dirty="0"/>
           </a:p>
@@ -6079,7 +6064,15 @@
           <a:p>
             <a:r>
               <a:rPr lang="de-DE" dirty="0"/>
-              <a:t>Neues Repository hinzufügen …</a:t>
+              <a:t>Theorie: </a:t>
+            </a:r>
+            <a:r>
+              <a:rPr lang="de-DE" dirty="0" err="1"/>
+              <a:t>hypermedia</a:t>
+            </a:r>
+            <a:r>
+              <a:rPr lang="de-DE" dirty="0"/>
+              <a:t> links</a:t>
             </a:r>
             <a:endParaRPr lang="en-GB" dirty="0"/>
           </a:p>
@@ -6102,21 +6095,44 @@
           <a:p>
             <a:r>
               <a:rPr lang="de-DE" dirty="0"/>
-              <a:t>Query: Anzahl alle Speakers von Firma X berechnen</a:t>
-            </a:r>
-          </a:p>
-          <a:p>
-            <a:r>
-              <a:rPr lang="de-DE" dirty="0"/>
-              <a:t>Native Query: Liste von alle eindeutige Firmen</a:t>
-            </a:r>
+              <a:t>Theorie – Navigation und Struktur</a:t>
+            </a:r>
+          </a:p>
+          <a:p>
+            <a:r>
+              <a:rPr lang="de-DE" dirty="0"/>
+              <a:t>REST via HAL Browser</a:t>
+            </a:r>
+          </a:p>
+          <a:p>
+            <a:r>
+              <a:rPr lang="de-DE" dirty="0"/>
+              <a:t>REST via Postman, </a:t>
+            </a:r>
+            <a:r>
+              <a:rPr lang="de-DE" dirty="0" err="1"/>
+              <a:t>associate</a:t>
+            </a:r>
+            <a:r>
+              <a:rPr lang="de-DE" dirty="0"/>
+              <a:t> Event </a:t>
+            </a:r>
+            <a:r>
+              <a:rPr lang="de-DE" dirty="0" err="1"/>
+              <a:t>with</a:t>
+            </a:r>
+            <a:r>
+              <a:rPr lang="de-DE" dirty="0"/>
+              <a:t> Speaker</a:t>
+            </a:r>
+            <a:endParaRPr lang="en-GB" dirty="0"/>
           </a:p>
         </p:txBody>
       </p:sp>
     </p:spTree>
     <p:extLst>
       <p:ext uri="{BB962C8B-B14F-4D97-AF65-F5344CB8AC3E}">
-        <p14:creationId xmlns:p14="http://schemas.microsoft.com/office/powerpoint/2010/main" val="2033767423"/>
+        <p14:creationId xmlns:p14="http://schemas.microsoft.com/office/powerpoint/2010/main" val="3366541771"/>
       </p:ext>
     </p:extLst>
   </p:cSld>
@@ -6155,10 +6171,16 @@
         </p:nvSpPr>
         <p:spPr/>
         <p:txBody>
-          <a:bodyPr/>
-          <a:lstStyle/>
-          <a:p>
-            <a:endParaRPr lang="en-GB"/>
+          <a:bodyPr>
+            <a:normAutofit fontScale="85000" lnSpcReduction="10000"/>
+          </a:bodyPr>
+          <a:lstStyle/>
+          <a:p>
+            <a:r>
+              <a:rPr lang="de-DE" dirty="0"/>
+              <a:t>30 min</a:t>
+            </a:r>
+            <a:endParaRPr lang="en-GB" dirty="0"/>
           </a:p>
         </p:txBody>
       </p:sp>
@@ -6226,7 +6248,7 @@
           <a:p>
             <a:r>
               <a:rPr lang="de-DE" dirty="0"/>
-              <a:t>Mittagspause</a:t>
+              <a:t>DAO umbauen (mit Links)</a:t>
             </a:r>
             <a:endParaRPr lang="en-GB" dirty="0"/>
           </a:p>
@@ -6254,7 +6276,7 @@
     </p:spTree>
     <p:extLst>
       <p:ext uri="{BB962C8B-B14F-4D97-AF65-F5344CB8AC3E}">
-        <p14:creationId xmlns:p14="http://schemas.microsoft.com/office/powerpoint/2010/main" val="2861645761"/>
+        <p14:creationId xmlns:p14="http://schemas.microsoft.com/office/powerpoint/2010/main" val="3239943257"/>
       </p:ext>
     </p:extLst>
   </p:cSld>
@@ -6283,7 +6305,7 @@
       </p:grpSpPr>
       <p:sp>
         <p:nvSpPr>
-          <p:cNvPr id="2" name="Textplatzhalter 1"/>
+          <p:cNvPr id="8" name="Textplatzhalter 7"/>
           <p:cNvSpPr>
             <a:spLocks noGrp="1"/>
           </p:cNvSpPr>
@@ -6294,13 +6316,13 @@
         <p:spPr/>
         <p:txBody>
           <a:bodyPr>
-            <a:normAutofit fontScale="85000" lnSpcReduction="10000"/>
+            <a:normAutofit/>
           </a:bodyPr>
           <a:lstStyle/>
           <a:p>
             <a:r>
               <a:rPr lang="de-DE" dirty="0"/>
-              <a:t>10 min</a:t>
+              <a:t>5 min</a:t>
             </a:r>
             <a:endParaRPr lang="en-GB" dirty="0"/>
           </a:p>
@@ -6308,7 +6330,7 @@
       </p:sp>
       <p:sp>
         <p:nvSpPr>
-          <p:cNvPr id="3" name="Fußzeilenplatzhalter 2"/>
+          <p:cNvPr id="2" name="Fußzeilenplatzhalter 1"/>
           <p:cNvSpPr>
             <a:spLocks noGrp="1"/>
           </p:cNvSpPr>
@@ -6331,7 +6353,7 @@
       </p:sp>
       <p:sp>
         <p:nvSpPr>
-          <p:cNvPr id="4" name="Foliennummernplatzhalter 3"/>
+          <p:cNvPr id="3" name="Foliennummernplatzhalter 2"/>
           <p:cNvSpPr>
             <a:spLocks noGrp="1"/>
           </p:cNvSpPr>
@@ -6355,7 +6377,7 @@
       </p:sp>
       <p:sp>
         <p:nvSpPr>
-          <p:cNvPr id="5" name="Titel 4"/>
+          <p:cNvPr id="4" name="Titel 3"/>
           <p:cNvSpPr>
             <a:spLocks noGrp="1"/>
           </p:cNvSpPr>
@@ -6370,15 +6392,27 @@
           <a:p>
             <a:r>
               <a:rPr lang="de-DE" dirty="0"/>
-              <a:t>Theorie: </a:t>
+              <a:t>IRL </a:t>
             </a:r>
             <a:r>
               <a:rPr lang="de-DE" dirty="0" err="1"/>
-              <a:t>hypermedia</a:t>
-            </a:r>
-            <a:r>
-              <a:rPr lang="de-DE" dirty="0"/>
-              <a:t> links</a:t>
+              <a:t>usage</a:t>
+            </a:r>
+            <a:r>
+              <a:rPr lang="de-DE" dirty="0"/>
+              <a:t> – </a:t>
+            </a:r>
+            <a:r>
+              <a:rPr lang="de-DE" dirty="0" err="1"/>
+              <a:t>flipchart</a:t>
+            </a:r>
+            <a:r>
+              <a:rPr lang="de-DE" dirty="0"/>
+              <a:t>, interaktives </a:t>
+            </a:r>
+            <a:r>
+              <a:rPr lang="de-DE" dirty="0" err="1"/>
+              <a:t>session</a:t>
             </a:r>
             <a:endParaRPr lang="en-GB" dirty="0"/>
           </a:p>
@@ -6386,7 +6420,7 @@
       </p:sp>
       <p:sp>
         <p:nvSpPr>
-          <p:cNvPr id="6" name="Textplatzhalter 5"/>
+          <p:cNvPr id="9" name="Textplatzhalter 8"/>
           <p:cNvSpPr>
             <a:spLocks noGrp="1"/>
           </p:cNvSpPr>
@@ -6400,37 +6434,140 @@
           <a:lstStyle/>
           <a:p>
             <a:r>
-              <a:rPr lang="de-DE" dirty="0"/>
-              <a:t>Theorie – Navigation und Struktur</a:t>
-            </a:r>
-          </a:p>
-          <a:p>
-            <a:r>
-              <a:rPr lang="de-DE" dirty="0"/>
-              <a:t>REST via HAL Browser</a:t>
-            </a:r>
-          </a:p>
-          <a:p>
-            <a:r>
-              <a:rPr lang="de-DE" dirty="0"/>
-              <a:t>REST via Postman, </a:t>
-            </a:r>
-            <a:r>
               <a:rPr lang="de-DE" dirty="0" err="1"/>
-              <a:t>associate</a:t>
-            </a:r>
-            <a:r>
-              <a:rPr lang="de-DE" dirty="0"/>
-              <a:t> Event </a:t>
+              <a:t>Reminder</a:t>
+            </a:r>
+            <a:r>
+              <a:rPr lang="de-DE" dirty="0"/>
+              <a:t>: </a:t>
             </a:r>
             <a:r>
               <a:rPr lang="de-DE" dirty="0" err="1"/>
-              <a:t>with</a:t>
-            </a:r>
-            <a:r>
-              <a:rPr lang="de-DE" dirty="0"/>
-              <a:t> Speaker</a:t>
-            </a:r>
+              <a:t>vorteile</a:t>
+            </a:r>
+            <a:r>
+              <a:rPr lang="de-DE" dirty="0"/>
+              <a:t> von Spring Data?</a:t>
+            </a:r>
+          </a:p>
+          <a:p>
+            <a:endParaRPr lang="de-DE" dirty="0"/>
+          </a:p>
+          <a:p>
+            <a:endParaRPr lang="de-DE" dirty="0"/>
+          </a:p>
+          <a:p>
+            <a:r>
+              <a:rPr lang="de-DE" dirty="0"/>
+              <a:t>Kleine/große Projekte – wenig Setup nötig. Large-</a:t>
+            </a:r>
+            <a:r>
+              <a:rPr lang="de-DE" dirty="0" err="1"/>
+              <a:t>scale</a:t>
+            </a:r>
+            <a:r>
+              <a:rPr lang="de-DE" dirty="0"/>
+              <a:t>, large-team </a:t>
+            </a:r>
+            <a:r>
+              <a:rPr lang="de-DE" dirty="0" err="1"/>
+              <a:t>Jave</a:t>
+            </a:r>
+            <a:r>
+              <a:rPr lang="de-DE" dirty="0"/>
+              <a:t> EE </a:t>
+            </a:r>
+            <a:r>
+              <a:rPr lang="de-DE" dirty="0" err="1"/>
+              <a:t>dev</a:t>
+            </a:r>
+            <a:endParaRPr lang="de-DE" dirty="0"/>
+          </a:p>
+          <a:p>
+            <a:r>
+              <a:rPr lang="de-DE" dirty="0"/>
+              <a:t>Schnell!</a:t>
+            </a:r>
+          </a:p>
+          <a:p>
+            <a:r>
+              <a:rPr lang="de-DE" dirty="0"/>
+              <a:t>Kundenprojekte … </a:t>
+            </a:r>
+            <a:r>
+              <a:rPr lang="de-DE" dirty="0" err="1"/>
+              <a:t>beispiele</a:t>
+            </a:r>
+            <a:r>
+              <a:rPr lang="de-DE" dirty="0"/>
+              <a:t> mit SAP REST </a:t>
+            </a:r>
+            <a:r>
+              <a:rPr lang="de-DE" dirty="0" err="1"/>
+              <a:t>service</a:t>
+            </a:r>
+            <a:r>
+              <a:rPr lang="de-DE" dirty="0"/>
+              <a:t>, </a:t>
+            </a:r>
+            <a:r>
+              <a:rPr lang="de-DE" dirty="0" err="1"/>
+              <a:t>media</a:t>
+            </a:r>
+            <a:r>
+              <a:rPr lang="de-DE" dirty="0"/>
+              <a:t> </a:t>
+            </a:r>
+            <a:r>
+              <a:rPr lang="de-DE" dirty="0" err="1"/>
+              <a:t>service</a:t>
+            </a:r>
+            <a:endParaRPr lang="de-DE" dirty="0"/>
+          </a:p>
+          <a:p>
+            <a:r>
+              <a:rPr lang="de-DE" dirty="0" err="1"/>
+              <a:t>Microservices</a:t>
+            </a:r>
+            <a:r>
+              <a:rPr lang="de-DE" dirty="0"/>
+              <a:t> – unabhängig, entkoppelte Komponenten</a:t>
+            </a:r>
+          </a:p>
+          <a:p>
+            <a:r>
+              <a:rPr lang="de-DE" dirty="0"/>
+              <a:t>Standard </a:t>
+            </a:r>
+            <a:r>
+              <a:rPr lang="de-DE" dirty="0" err="1"/>
+              <a:t>conventions</a:t>
+            </a:r>
+            <a:r>
+              <a:rPr lang="de-DE" dirty="0"/>
+              <a:t> aber trotzdem möglich </a:t>
+            </a:r>
+            <a:r>
+              <a:rPr lang="de-DE" dirty="0" err="1"/>
+              <a:t>custom</a:t>
+            </a:r>
+            <a:r>
+              <a:rPr lang="de-DE" dirty="0"/>
+              <a:t> </a:t>
+            </a:r>
+            <a:r>
+              <a:rPr lang="de-DE" dirty="0" err="1"/>
+              <a:t>implementierungen</a:t>
+            </a:r>
+            <a:r>
+              <a:rPr lang="de-DE" dirty="0"/>
+              <a:t> zu schreiben</a:t>
+            </a:r>
+          </a:p>
+          <a:p>
+            <a:endParaRPr lang="de-DE" dirty="0"/>
+          </a:p>
+          <a:p>
             <a:endParaRPr lang="en-GB" dirty="0"/>
           </a:p>
         </p:txBody>
@@ -6438,7 +6575,7 @@
     </p:spTree>
     <p:extLst>
       <p:ext uri="{BB962C8B-B14F-4D97-AF65-F5344CB8AC3E}">
-        <p14:creationId xmlns:p14="http://schemas.microsoft.com/office/powerpoint/2010/main" val="3366541771"/>
+        <p14:creationId xmlns:p14="http://schemas.microsoft.com/office/powerpoint/2010/main" val="48103453"/>
       </p:ext>
     </p:extLst>
   </p:cSld>
@@ -6477,16 +6614,10 @@
         </p:nvSpPr>
         <p:spPr/>
         <p:txBody>
-          <a:bodyPr>
-            <a:normAutofit fontScale="85000" lnSpcReduction="10000"/>
-          </a:bodyPr>
-          <a:lstStyle/>
-          <a:p>
-            <a:r>
-              <a:rPr lang="de-DE" dirty="0"/>
-              <a:t>30 min</a:t>
-            </a:r>
-            <a:endParaRPr lang="en-GB" dirty="0"/>
+          <a:bodyPr/>
+          <a:lstStyle/>
+          <a:p>
+            <a:endParaRPr lang="en-GB"/>
           </a:p>
         </p:txBody>
       </p:sp>
@@ -6554,7 +6685,23 @@
           <a:p>
             <a:r>
               <a:rPr lang="de-DE" dirty="0"/>
-              <a:t>DAO umbauen (mit Links)</a:t>
+              <a:t>Extra: </a:t>
+            </a:r>
+            <a:r>
+              <a:rPr lang="de-DE" dirty="0" err="1"/>
+              <a:t>Paging</a:t>
+            </a:r>
+            <a:r>
+              <a:rPr lang="de-DE" dirty="0"/>
+              <a:t> + </a:t>
+            </a:r>
+            <a:r>
+              <a:rPr lang="de-DE" dirty="0" err="1"/>
+              <a:t>Sorting</a:t>
+            </a:r>
+            <a:r>
+              <a:rPr lang="de-DE" dirty="0"/>
+              <a:t> Repository</a:t>
             </a:r>
             <a:endParaRPr lang="en-GB" dirty="0"/>
           </a:p>
@@ -6575,14 +6722,57 @@
           <a:bodyPr/>
           <a:lstStyle/>
           <a:p>
-            <a:endParaRPr lang="en-GB"/>
+            <a:r>
+              <a:rPr lang="de-DE" dirty="0" err="1"/>
+              <a:t>PagingAndSortingRepository</a:t>
+            </a:r>
+            <a:r>
+              <a:rPr lang="de-DE" dirty="0"/>
+              <a:t> verwenden (statt </a:t>
+            </a:r>
+            <a:r>
+              <a:rPr lang="de-DE" dirty="0" err="1"/>
+              <a:t>CRUDRepository</a:t>
+            </a:r>
+            <a:r>
+              <a:rPr lang="de-DE" dirty="0"/>
+              <a:t>)</a:t>
+            </a:r>
+          </a:p>
+          <a:p>
+            <a:r>
+              <a:rPr lang="de-DE" dirty="0"/>
+              <a:t>In HAL Browser anschauen …</a:t>
+            </a:r>
+          </a:p>
+          <a:p>
+            <a:r>
+              <a:rPr lang="de-DE" dirty="0"/>
+              <a:t>Oder …</a:t>
+            </a:r>
+          </a:p>
+          <a:p>
+            <a:endParaRPr lang="de-DE" dirty="0"/>
+          </a:p>
+          <a:p>
+            <a:r>
+              <a:rPr lang="de-DE" dirty="0"/>
+              <a:t>DAO Implementierung erweitern</a:t>
+            </a:r>
+          </a:p>
+          <a:p>
+            <a:r>
+              <a:rPr lang="de-DE" dirty="0"/>
+              <a:t>UI erweitern</a:t>
+            </a:r>
+            <a:endParaRPr lang="en-GB" dirty="0"/>
           </a:p>
         </p:txBody>
       </p:sp>
     </p:spTree>
     <p:extLst>
       <p:ext uri="{BB962C8B-B14F-4D97-AF65-F5344CB8AC3E}">
-        <p14:creationId xmlns:p14="http://schemas.microsoft.com/office/powerpoint/2010/main" val="3239943257"/>
+        <p14:creationId xmlns:p14="http://schemas.microsoft.com/office/powerpoint/2010/main" val="637595942"/>
       </p:ext>
     </p:extLst>
   </p:cSld>
@@ -6611,7 +6801,7 @@
       </p:grpSpPr>
       <p:sp>
         <p:nvSpPr>
-          <p:cNvPr id="8" name="Textplatzhalter 7"/>
+          <p:cNvPr id="2" name="Textplatzhalter 1"/>
           <p:cNvSpPr>
             <a:spLocks noGrp="1"/>
           </p:cNvSpPr>
@@ -6622,13 +6812,13 @@
         <p:spPr/>
         <p:txBody>
           <a:bodyPr>
-            <a:normAutofit/>
+            <a:normAutofit fontScale="85000" lnSpcReduction="10000"/>
           </a:bodyPr>
           <a:lstStyle/>
           <a:p>
             <a:r>
               <a:rPr lang="de-DE" dirty="0"/>
-              <a:t>5 min</a:t>
+              <a:t>15 min</a:t>
             </a:r>
             <a:endParaRPr lang="en-GB" dirty="0"/>
           </a:p>
@@ -6636,7 +6826,7 @@
       </p:sp>
       <p:sp>
         <p:nvSpPr>
-          <p:cNvPr id="2" name="Fußzeilenplatzhalter 1"/>
+          <p:cNvPr id="3" name="Fußzeilenplatzhalter 2"/>
           <p:cNvSpPr>
             <a:spLocks noGrp="1"/>
           </p:cNvSpPr>
@@ -6659,7 +6849,7 @@
       </p:sp>
       <p:sp>
         <p:nvSpPr>
-          <p:cNvPr id="3" name="Foliennummernplatzhalter 2"/>
+          <p:cNvPr id="4" name="Foliennummernplatzhalter 3"/>
           <p:cNvSpPr>
             <a:spLocks noGrp="1"/>
           </p:cNvSpPr>
@@ -6683,7 +6873,7 @@
       </p:sp>
       <p:sp>
         <p:nvSpPr>
-          <p:cNvPr id="4" name="Titel 3"/>
+          <p:cNvPr id="5" name="Titel 4"/>
           <p:cNvSpPr>
             <a:spLocks noGrp="1"/>
           </p:cNvSpPr>
@@ -6697,28 +6887,12 @@
           <a:lstStyle/>
           <a:p>
             <a:r>
-              <a:rPr lang="de-DE" dirty="0"/>
-              <a:t>IRL </a:t>
-            </a:r>
-            <a:r>
               <a:rPr lang="de-DE" dirty="0" err="1"/>
-              <a:t>usage</a:t>
-            </a:r>
-            <a:r>
-              <a:rPr lang="de-DE" dirty="0"/>
-              <a:t> – </a:t>
-            </a:r>
-            <a:r>
-              <a:rPr lang="de-DE" dirty="0" err="1"/>
-              <a:t>flipchart</a:t>
-            </a:r>
-            <a:r>
-              <a:rPr lang="de-DE" dirty="0"/>
-              <a:t>, interaktives </a:t>
-            </a:r>
-            <a:r>
-              <a:rPr lang="de-DE" dirty="0" err="1"/>
-              <a:t>session</a:t>
+              <a:t>React</a:t>
+            </a:r>
+            <a:r>
+              <a:rPr lang="de-DE" dirty="0"/>
+              <a:t> Beispiel</a:t>
             </a:r>
             <a:endParaRPr lang="en-GB" dirty="0"/>
           </a:p>
@@ -6726,7 +6900,7 @@
       </p:sp>
       <p:sp>
         <p:nvSpPr>
-          <p:cNvPr id="9" name="Textplatzhalter 8"/>
+          <p:cNvPr id="6" name="Textplatzhalter 5"/>
           <p:cNvSpPr>
             <a:spLocks noGrp="1"/>
           </p:cNvSpPr>
@@ -6740,140 +6914,21 @@
           <a:lstStyle/>
           <a:p>
             <a:r>
-              <a:rPr lang="de-DE" dirty="0" err="1"/>
-              <a:t>Reminder</a:t>
-            </a:r>
-            <a:r>
-              <a:rPr lang="de-DE" dirty="0"/>
-              <a:t>: </a:t>
-            </a:r>
-            <a:r>
-              <a:rPr lang="de-DE" dirty="0" err="1"/>
-              <a:t>vorteile</a:t>
-            </a:r>
-            <a:r>
-              <a:rPr lang="de-DE" dirty="0"/>
-              <a:t> von Spring Data?</a:t>
-            </a:r>
-          </a:p>
-          <a:p>
-            <a:endParaRPr lang="de-DE" dirty="0"/>
-          </a:p>
-          <a:p>
-            <a:endParaRPr lang="de-DE" dirty="0"/>
-          </a:p>
-          <a:p>
-            <a:r>
-              <a:rPr lang="de-DE" dirty="0"/>
-              <a:t>Kleine/große Projekte – wenig Setup nötig. Large-</a:t>
-            </a:r>
-            <a:r>
-              <a:rPr lang="de-DE" dirty="0" err="1"/>
-              <a:t>scale</a:t>
-            </a:r>
-            <a:r>
-              <a:rPr lang="de-DE" dirty="0"/>
-              <a:t>, large-team </a:t>
-            </a:r>
-            <a:r>
-              <a:rPr lang="de-DE" dirty="0" err="1"/>
-              <a:t>Jave</a:t>
-            </a:r>
-            <a:r>
-              <a:rPr lang="de-DE" dirty="0"/>
-              <a:t> EE </a:t>
-            </a:r>
-            <a:r>
-              <a:rPr lang="de-DE" dirty="0" err="1"/>
-              <a:t>dev</a:t>
-            </a:r>
-            <a:endParaRPr lang="de-DE" dirty="0"/>
-          </a:p>
-          <a:p>
-            <a:r>
-              <a:rPr lang="de-DE" dirty="0"/>
-              <a:t>Schnell!</a:t>
-            </a:r>
-          </a:p>
-          <a:p>
-            <a:r>
-              <a:rPr lang="de-DE" dirty="0"/>
-              <a:t>Kundenprojekte … </a:t>
-            </a:r>
-            <a:r>
-              <a:rPr lang="de-DE" dirty="0" err="1"/>
-              <a:t>beispiele</a:t>
-            </a:r>
-            <a:r>
-              <a:rPr lang="de-DE" dirty="0"/>
-              <a:t> mit SAP REST </a:t>
-            </a:r>
-            <a:r>
-              <a:rPr lang="de-DE" dirty="0" err="1"/>
-              <a:t>service</a:t>
-            </a:r>
-            <a:r>
-              <a:rPr lang="de-DE" dirty="0"/>
-              <a:t>, </a:t>
-            </a:r>
-            <a:r>
-              <a:rPr lang="de-DE" dirty="0" err="1"/>
-              <a:t>media</a:t>
-            </a:r>
-            <a:r>
-              <a:rPr lang="de-DE" dirty="0"/>
-              <a:t> </a:t>
-            </a:r>
-            <a:r>
-              <a:rPr lang="de-DE" dirty="0" err="1"/>
-              <a:t>service</a:t>
-            </a:r>
-            <a:endParaRPr lang="de-DE" dirty="0"/>
-          </a:p>
-          <a:p>
-            <a:r>
-              <a:rPr lang="de-DE" dirty="0" err="1"/>
-              <a:t>Microservices</a:t>
-            </a:r>
-            <a:r>
-              <a:rPr lang="de-DE" dirty="0"/>
-              <a:t> – unabhängig, entkoppelte Komponenten</a:t>
-            </a:r>
-          </a:p>
-          <a:p>
-            <a:r>
-              <a:rPr lang="de-DE" dirty="0"/>
-              <a:t>Standard </a:t>
-            </a:r>
-            <a:r>
-              <a:rPr lang="de-DE" dirty="0" err="1"/>
-              <a:t>conventions</a:t>
-            </a:r>
-            <a:r>
-              <a:rPr lang="de-DE" dirty="0"/>
-              <a:t> aber trotzdem möglich </a:t>
-            </a:r>
-            <a:r>
-              <a:rPr lang="de-DE" dirty="0" err="1"/>
-              <a:t>custom</a:t>
-            </a:r>
-            <a:r>
-              <a:rPr lang="de-DE" dirty="0"/>
-              <a:t> </a:t>
-            </a:r>
-            <a:r>
-              <a:rPr lang="de-DE" dirty="0" err="1"/>
-              <a:t>implementierungen</a:t>
-            </a:r>
-            <a:r>
-              <a:rPr lang="de-DE" dirty="0"/>
-              <a:t> zu schreiben</a:t>
-            </a:r>
-          </a:p>
-          <a:p>
-            <a:endParaRPr lang="de-DE" dirty="0"/>
-          </a:p>
-          <a:p>
+              <a:rPr lang="de-DE" dirty="0"/>
+              <a:t>Unterschied, SPA, direkte REST Aufrufe</a:t>
+            </a:r>
+          </a:p>
+          <a:p>
+            <a:r>
+              <a:rPr lang="de-DE" dirty="0"/>
+              <a:t>Flipchart Erklärung</a:t>
+            </a:r>
+          </a:p>
+          <a:p>
+            <a:r>
+              <a:rPr lang="de-DE" dirty="0"/>
+              <a:t>Selber auschecken ?</a:t>
+            </a:r>
             <a:endParaRPr lang="en-GB" dirty="0"/>
           </a:p>
         </p:txBody>
@@ -6881,7 +6936,7 @@
     </p:spTree>
     <p:extLst>
       <p:ext uri="{BB962C8B-B14F-4D97-AF65-F5344CB8AC3E}">
-        <p14:creationId xmlns:p14="http://schemas.microsoft.com/office/powerpoint/2010/main" val="48103453"/>
+        <p14:creationId xmlns:p14="http://schemas.microsoft.com/office/powerpoint/2010/main" val="575469459"/>
       </p:ext>
     </p:extLst>
   </p:cSld>
@@ -6920,10 +6975,16 @@
         </p:nvSpPr>
         <p:spPr/>
         <p:txBody>
-          <a:bodyPr/>
-          <a:lstStyle/>
-          <a:p>
-            <a:endParaRPr lang="en-GB"/>
+          <a:bodyPr>
+            <a:normAutofit fontScale="85000" lnSpcReduction="10000"/>
+          </a:bodyPr>
+          <a:lstStyle/>
+          <a:p>
+            <a:r>
+              <a:rPr lang="de-DE" dirty="0"/>
+              <a:t>15 min</a:t>
+            </a:r>
+            <a:endParaRPr lang="en-GB" dirty="0"/>
           </a:p>
         </p:txBody>
       </p:sp>
@@ -6969,373 +7030,6 @@
               <a:rPr lang="de-DE" smtClean="0"/>
               <a:pPr/>
               <a:t>17</a:t>
-            </a:fld>
-            <a:endParaRPr lang="de-DE" dirty="0"/>
-          </a:p>
-        </p:txBody>
-      </p:sp>
-      <p:sp>
-        <p:nvSpPr>
-          <p:cNvPr id="5" name="Titel 4"/>
-          <p:cNvSpPr>
-            <a:spLocks noGrp="1"/>
-          </p:cNvSpPr>
-          <p:nvPr>
-            <p:ph type="title"/>
-          </p:nvPr>
-        </p:nvSpPr>
-        <p:spPr/>
-        <p:txBody>
-          <a:bodyPr/>
-          <a:lstStyle/>
-          <a:p>
-            <a:r>
-              <a:rPr lang="de-DE" dirty="0"/>
-              <a:t>Extra: </a:t>
-            </a:r>
-            <a:r>
-              <a:rPr lang="de-DE" dirty="0" err="1"/>
-              <a:t>Paging</a:t>
-            </a:r>
-            <a:r>
-              <a:rPr lang="de-DE" dirty="0"/>
-              <a:t> + </a:t>
-            </a:r>
-            <a:r>
-              <a:rPr lang="de-DE" dirty="0" err="1"/>
-              <a:t>Sorting</a:t>
-            </a:r>
-            <a:r>
-              <a:rPr lang="de-DE" dirty="0"/>
-              <a:t> Repository</a:t>
-            </a:r>
-            <a:endParaRPr lang="en-GB" dirty="0"/>
-          </a:p>
-        </p:txBody>
-      </p:sp>
-      <p:sp>
-        <p:nvSpPr>
-          <p:cNvPr id="6" name="Textplatzhalter 5"/>
-          <p:cNvSpPr>
-            <a:spLocks noGrp="1"/>
-          </p:cNvSpPr>
-          <p:nvPr>
-            <p:ph type="body" sz="quarter" idx="12"/>
-          </p:nvPr>
-        </p:nvSpPr>
-        <p:spPr/>
-        <p:txBody>
-          <a:bodyPr/>
-          <a:lstStyle/>
-          <a:p>
-            <a:r>
-              <a:rPr lang="de-DE" dirty="0" err="1"/>
-              <a:t>PagingAndSortingRepository</a:t>
-            </a:r>
-            <a:r>
-              <a:rPr lang="de-DE" dirty="0"/>
-              <a:t> verwenden (statt </a:t>
-            </a:r>
-            <a:r>
-              <a:rPr lang="de-DE" dirty="0" err="1"/>
-              <a:t>CRUDRepository</a:t>
-            </a:r>
-            <a:r>
-              <a:rPr lang="de-DE" dirty="0"/>
-              <a:t>)</a:t>
-            </a:r>
-          </a:p>
-          <a:p>
-            <a:r>
-              <a:rPr lang="de-DE" dirty="0"/>
-              <a:t>In HAL Browser anschauen …</a:t>
-            </a:r>
-          </a:p>
-          <a:p>
-            <a:r>
-              <a:rPr lang="de-DE" dirty="0"/>
-              <a:t>Oder …</a:t>
-            </a:r>
-          </a:p>
-          <a:p>
-            <a:endParaRPr lang="de-DE" dirty="0"/>
-          </a:p>
-          <a:p>
-            <a:r>
-              <a:rPr lang="de-DE" dirty="0"/>
-              <a:t>DAO Implementierung erweitern</a:t>
-            </a:r>
-          </a:p>
-          <a:p>
-            <a:r>
-              <a:rPr lang="de-DE" dirty="0"/>
-              <a:t>UI erweitern</a:t>
-            </a:r>
-            <a:endParaRPr lang="en-GB" dirty="0"/>
-          </a:p>
-        </p:txBody>
-      </p:sp>
-    </p:spTree>
-    <p:extLst>
-      <p:ext uri="{BB962C8B-B14F-4D97-AF65-F5344CB8AC3E}">
-        <p14:creationId xmlns:p14="http://schemas.microsoft.com/office/powerpoint/2010/main" val="637595942"/>
-      </p:ext>
-    </p:extLst>
-  </p:cSld>
-  <p:clrMapOvr>
-    <a:masterClrMapping/>
-  </p:clrMapOvr>
-</p:sld>
-</file>
-
-<file path=ppt/slides/slide18.xml><?xml version="1.0" encoding="utf-8"?>
-<p:sld xmlns:a="http://schemas.openxmlformats.org/drawingml/2006/main" xmlns:r="http://schemas.openxmlformats.org/officeDocument/2006/relationships" xmlns:p="http://schemas.openxmlformats.org/presentationml/2006/main">
-  <p:cSld>
-    <p:spTree>
-      <p:nvGrpSpPr>
-        <p:cNvPr id="1" name=""/>
-        <p:cNvGrpSpPr/>
-        <p:nvPr/>
-      </p:nvGrpSpPr>
-      <p:grpSpPr>
-        <a:xfrm>
-          <a:off x="0" y="0"/>
-          <a:ext cx="0" cy="0"/>
-          <a:chOff x="0" y="0"/>
-          <a:chExt cx="0" cy="0"/>
-        </a:xfrm>
-      </p:grpSpPr>
-      <p:sp>
-        <p:nvSpPr>
-          <p:cNvPr id="2" name="Textplatzhalter 1"/>
-          <p:cNvSpPr>
-            <a:spLocks noGrp="1"/>
-          </p:cNvSpPr>
-          <p:nvPr>
-            <p:ph type="body" sz="half" idx="2"/>
-          </p:nvPr>
-        </p:nvSpPr>
-        <p:spPr/>
-        <p:txBody>
-          <a:bodyPr>
-            <a:normAutofit fontScale="85000" lnSpcReduction="10000"/>
-          </a:bodyPr>
-          <a:lstStyle/>
-          <a:p>
-            <a:r>
-              <a:rPr lang="de-DE" dirty="0"/>
-              <a:t>15 min</a:t>
-            </a:r>
-            <a:endParaRPr lang="en-GB" dirty="0"/>
-          </a:p>
-        </p:txBody>
-      </p:sp>
-      <p:sp>
-        <p:nvSpPr>
-          <p:cNvPr id="3" name="Fußzeilenplatzhalter 2"/>
-          <p:cNvSpPr>
-            <a:spLocks noGrp="1"/>
-          </p:cNvSpPr>
-          <p:nvPr>
-            <p:ph type="ftr" sz="quarter" idx="10"/>
-          </p:nvPr>
-        </p:nvSpPr>
-        <p:spPr/>
-        <p:txBody>
-          <a:bodyPr/>
-          <a:lstStyle/>
-          <a:p>
-            <a:r>
-              <a:rPr lang="en-US"/>
-              <a:t>Experts in agile software engineering</a:t>
-            </a:r>
-            <a:endParaRPr lang="de-DE" dirty="0"/>
-          </a:p>
-        </p:txBody>
-      </p:sp>
-      <p:sp>
-        <p:nvSpPr>
-          <p:cNvPr id="4" name="Foliennummernplatzhalter 3"/>
-          <p:cNvSpPr>
-            <a:spLocks noGrp="1"/>
-          </p:cNvSpPr>
-          <p:nvPr>
-            <p:ph type="sldNum" sz="quarter" idx="11"/>
-          </p:nvPr>
-        </p:nvSpPr>
-        <p:spPr/>
-        <p:txBody>
-          <a:bodyPr/>
-          <a:lstStyle/>
-          <a:p>
-            <a:fld id="{6C6AE60A-B69C-4790-82F7-3882EDF23186}" type="slidenum">
-              <a:rPr lang="de-DE" smtClean="0"/>
-              <a:pPr/>
-              <a:t>18</a:t>
-            </a:fld>
-            <a:endParaRPr lang="de-DE" dirty="0"/>
-          </a:p>
-        </p:txBody>
-      </p:sp>
-      <p:sp>
-        <p:nvSpPr>
-          <p:cNvPr id="5" name="Titel 4"/>
-          <p:cNvSpPr>
-            <a:spLocks noGrp="1"/>
-          </p:cNvSpPr>
-          <p:nvPr>
-            <p:ph type="title"/>
-          </p:nvPr>
-        </p:nvSpPr>
-        <p:spPr/>
-        <p:txBody>
-          <a:bodyPr/>
-          <a:lstStyle/>
-          <a:p>
-            <a:r>
-              <a:rPr lang="de-DE" dirty="0" err="1"/>
-              <a:t>React</a:t>
-            </a:r>
-            <a:r>
-              <a:rPr lang="de-DE" dirty="0"/>
-              <a:t> Beispiel</a:t>
-            </a:r>
-            <a:endParaRPr lang="en-GB" dirty="0"/>
-          </a:p>
-        </p:txBody>
-      </p:sp>
-      <p:sp>
-        <p:nvSpPr>
-          <p:cNvPr id="6" name="Textplatzhalter 5"/>
-          <p:cNvSpPr>
-            <a:spLocks noGrp="1"/>
-          </p:cNvSpPr>
-          <p:nvPr>
-            <p:ph type="body" sz="quarter" idx="12"/>
-          </p:nvPr>
-        </p:nvSpPr>
-        <p:spPr/>
-        <p:txBody>
-          <a:bodyPr/>
-          <a:lstStyle/>
-          <a:p>
-            <a:r>
-              <a:rPr lang="de-DE" dirty="0"/>
-              <a:t>Unterschied, SPA, direkte REST Aufrufe</a:t>
-            </a:r>
-          </a:p>
-          <a:p>
-            <a:r>
-              <a:rPr lang="de-DE" dirty="0"/>
-              <a:t>Flipchart Erklärung</a:t>
-            </a:r>
-          </a:p>
-          <a:p>
-            <a:r>
-              <a:rPr lang="de-DE" dirty="0"/>
-              <a:t>Selber auschecken ?</a:t>
-            </a:r>
-            <a:endParaRPr lang="en-GB" dirty="0"/>
-          </a:p>
-        </p:txBody>
-      </p:sp>
-    </p:spTree>
-    <p:extLst>
-      <p:ext uri="{BB962C8B-B14F-4D97-AF65-F5344CB8AC3E}">
-        <p14:creationId xmlns:p14="http://schemas.microsoft.com/office/powerpoint/2010/main" val="575469459"/>
-      </p:ext>
-    </p:extLst>
-  </p:cSld>
-  <p:clrMapOvr>
-    <a:masterClrMapping/>
-  </p:clrMapOvr>
-</p:sld>
-</file>
-
-<file path=ppt/slides/slide19.xml><?xml version="1.0" encoding="utf-8"?>
-<p:sld xmlns:a="http://schemas.openxmlformats.org/drawingml/2006/main" xmlns:r="http://schemas.openxmlformats.org/officeDocument/2006/relationships" xmlns:p="http://schemas.openxmlformats.org/presentationml/2006/main">
-  <p:cSld>
-    <p:spTree>
-      <p:nvGrpSpPr>
-        <p:cNvPr id="1" name=""/>
-        <p:cNvGrpSpPr/>
-        <p:nvPr/>
-      </p:nvGrpSpPr>
-      <p:grpSpPr>
-        <a:xfrm>
-          <a:off x="0" y="0"/>
-          <a:ext cx="0" cy="0"/>
-          <a:chOff x="0" y="0"/>
-          <a:chExt cx="0" cy="0"/>
-        </a:xfrm>
-      </p:grpSpPr>
-      <p:sp>
-        <p:nvSpPr>
-          <p:cNvPr id="2" name="Textplatzhalter 1"/>
-          <p:cNvSpPr>
-            <a:spLocks noGrp="1"/>
-          </p:cNvSpPr>
-          <p:nvPr>
-            <p:ph type="body" sz="half" idx="2"/>
-          </p:nvPr>
-        </p:nvSpPr>
-        <p:spPr/>
-        <p:txBody>
-          <a:bodyPr>
-            <a:normAutofit fontScale="85000" lnSpcReduction="10000"/>
-          </a:bodyPr>
-          <a:lstStyle/>
-          <a:p>
-            <a:r>
-              <a:rPr lang="de-DE" dirty="0"/>
-              <a:t>15 min</a:t>
-            </a:r>
-            <a:endParaRPr lang="en-GB" dirty="0"/>
-          </a:p>
-        </p:txBody>
-      </p:sp>
-      <p:sp>
-        <p:nvSpPr>
-          <p:cNvPr id="3" name="Fußzeilenplatzhalter 2"/>
-          <p:cNvSpPr>
-            <a:spLocks noGrp="1"/>
-          </p:cNvSpPr>
-          <p:nvPr>
-            <p:ph type="ftr" sz="quarter" idx="10"/>
-          </p:nvPr>
-        </p:nvSpPr>
-        <p:spPr/>
-        <p:txBody>
-          <a:bodyPr/>
-          <a:lstStyle/>
-          <a:p>
-            <a:r>
-              <a:rPr lang="en-US"/>
-              <a:t>Experts in agile software engineering</a:t>
-            </a:r>
-            <a:endParaRPr lang="de-DE" dirty="0"/>
-          </a:p>
-        </p:txBody>
-      </p:sp>
-      <p:sp>
-        <p:nvSpPr>
-          <p:cNvPr id="4" name="Foliennummernplatzhalter 3"/>
-          <p:cNvSpPr>
-            <a:spLocks noGrp="1"/>
-          </p:cNvSpPr>
-          <p:nvPr>
-            <p:ph type="sldNum" sz="quarter" idx="11"/>
-          </p:nvPr>
-        </p:nvSpPr>
-        <p:spPr/>
-        <p:txBody>
-          <a:bodyPr/>
-          <a:lstStyle/>
-          <a:p>
-            <a:fld id="{6C6AE60A-B69C-4790-82F7-3882EDF23186}" type="slidenum">
-              <a:rPr lang="de-DE" smtClean="0"/>
-              <a:pPr/>
-              <a:t>19</a:t>
             </a:fld>
             <a:endParaRPr lang="de-DE" dirty="0"/>
           </a:p>
@@ -8156,30 +7850,6 @@
       </p:grpSpPr>
       <p:sp>
         <p:nvSpPr>
-          <p:cNvPr id="8" name="Textplatzhalter 7"/>
-          <p:cNvSpPr>
-            <a:spLocks noGrp="1"/>
-          </p:cNvSpPr>
-          <p:nvPr>
-            <p:ph type="body" sz="half" idx="2"/>
-          </p:nvPr>
-        </p:nvSpPr>
-        <p:spPr/>
-        <p:txBody>
-          <a:bodyPr>
-            <a:normAutofit fontScale="85000" lnSpcReduction="10000"/>
-          </a:bodyPr>
-          <a:lstStyle/>
-          <a:p>
-            <a:r>
-              <a:rPr lang="de-DE" dirty="0"/>
-              <a:t>30 Min</a:t>
-            </a:r>
-          </a:p>
-        </p:txBody>
-      </p:sp>
-      <p:sp>
-        <p:nvSpPr>
           <p:cNvPr id="2" name="Fußzeilenplatzhalter 1"/>
           <p:cNvSpPr>
             <a:spLocks noGrp="1"/>
@@ -8249,7 +7919,7 @@
       </p:sp>
       <p:sp>
         <p:nvSpPr>
-          <p:cNvPr id="9" name="Textplatzhalter 8"/>
+          <p:cNvPr id="5" name="Textplatzhalter 4"/>
           <p:cNvSpPr>
             <a:spLocks noGrp="1"/>
           </p:cNvSpPr>
@@ -8259,11 +7929,10 @@
         </p:nvSpPr>
         <p:spPr/>
         <p:txBody>
-          <a:bodyPr/>
-          <a:lstStyle/>
-          <a:p>
-            <a:endParaRPr lang="de-DE" dirty="0"/>
-          </a:p>
+          <a:bodyPr>
+            <a:normAutofit/>
+          </a:bodyPr>
+          <a:lstStyle/>
           <a:p>
             <a:r>
               <a:rPr lang="de-DE" dirty="0" err="1"/>
@@ -8307,22 +7976,13 @@
               <a:rPr lang="de-DE" dirty="0"/>
               <a:t>H2 DB</a:t>
             </a:r>
-          </a:p>
-          <a:p>
-            <a:endParaRPr lang="de-DE" dirty="0"/>
-          </a:p>
-          <a:p>
-            <a:endParaRPr lang="de-DE" dirty="0"/>
-          </a:p>
-          <a:p>
-            <a:endParaRPr lang="de-DE" dirty="0"/>
           </a:p>
         </p:txBody>
       </p:sp>
     </p:spTree>
     <p:extLst>
       <p:ext uri="{BB962C8B-B14F-4D97-AF65-F5344CB8AC3E}">
-        <p14:creationId xmlns:p14="http://schemas.microsoft.com/office/powerpoint/2010/main" val="1899478948"/>
+        <p14:creationId xmlns:p14="http://schemas.microsoft.com/office/powerpoint/2010/main" val="1413780197"/>
       </p:ext>
     </p:extLst>
   </p:cSld>
@@ -8474,7 +8134,7 @@
           <a:p>
             <a:r>
               <a:rPr lang="de-DE" dirty="0"/>
-              <a:t>Projekt von GitHub auschecken (siehe Email)</a:t>
+              <a:t>Projekt von GitHub auschecken</a:t>
             </a:r>
           </a:p>
           <a:p>
@@ -8631,7 +8291,19 @@
           <a:p>
             <a:r>
               <a:rPr lang="de-DE" dirty="0"/>
-              <a:t>Pause</a:t>
+              <a:t>Spring Data </a:t>
+            </a:r>
+            <a:r>
+              <a:rPr lang="de-DE" dirty="0" err="1"/>
+              <a:t>Queries</a:t>
+            </a:r>
+            <a:r>
+              <a:rPr lang="de-DE" dirty="0"/>
+              <a:t> + </a:t>
+            </a:r>
+            <a:r>
+              <a:rPr lang="de-DE" dirty="0" err="1"/>
+              <a:t>Repositories</a:t>
             </a:r>
             <a:endParaRPr lang="en-GB" dirty="0"/>
           </a:p>
@@ -8652,14 +8324,92 @@
           <a:bodyPr/>
           <a:lstStyle/>
           <a:p>
-            <a:endParaRPr lang="en-GB"/>
+            <a:r>
+              <a:rPr lang="de-DE" dirty="0"/>
+              <a:t>Query </a:t>
+            </a:r>
+            <a:r>
+              <a:rPr lang="de-DE" dirty="0" err="1"/>
+              <a:t>syntax</a:t>
+            </a:r>
+            <a:r>
+              <a:rPr lang="de-DE" dirty="0"/>
+              <a:t> (IDE Unterstützung, </a:t>
+            </a:r>
+            <a:r>
+              <a:rPr lang="de-DE" dirty="0" err="1"/>
+              <a:t>IntelliJ</a:t>
+            </a:r>
+            <a:r>
+              <a:rPr lang="de-DE" dirty="0"/>
+              <a:t>, )</a:t>
+            </a:r>
+          </a:p>
+          <a:p>
+            <a:r>
+              <a:rPr lang="de-DE" dirty="0" err="1"/>
+              <a:t>Repositories</a:t>
+            </a:r>
+            <a:r>
+              <a:rPr lang="de-DE" dirty="0"/>
+              <a:t> (CRUD, </a:t>
+            </a:r>
+            <a:r>
+              <a:rPr lang="de-DE" dirty="0" err="1"/>
+              <a:t>PagingAndSorting</a:t>
+            </a:r>
+            <a:r>
+              <a:rPr lang="de-DE" dirty="0"/>
+              <a:t> …)</a:t>
+            </a:r>
+          </a:p>
+          <a:p>
+            <a:r>
+              <a:rPr lang="de-DE" dirty="0"/>
+              <a:t>Request </a:t>
+            </a:r>
+            <a:r>
+              <a:rPr lang="de-DE" dirty="0" err="1"/>
+              <a:t>params</a:t>
+            </a:r>
+            <a:endParaRPr lang="de-DE" dirty="0"/>
+          </a:p>
+          <a:p>
+            <a:r>
+              <a:rPr lang="de-DE" dirty="0"/>
+              <a:t>Native </a:t>
+            </a:r>
+            <a:r>
+              <a:rPr lang="de-DE" dirty="0" err="1"/>
+              <a:t>Queries</a:t>
+            </a:r>
+            <a:endParaRPr lang="de-DE" dirty="0"/>
+          </a:p>
+          <a:p>
+            <a:endParaRPr lang="de-DE" dirty="0"/>
+          </a:p>
+          <a:p>
+            <a:pPr marL="0" indent="0">
+              <a:buNone/>
+            </a:pPr>
+            <a:r>
+              <a:rPr lang="de-DE" dirty="0" err="1"/>
+              <a:t>Documentation</a:t>
+            </a:r>
+            <a:r>
+              <a:rPr lang="de-DE" dirty="0"/>
+              <a:t>: http://docs.spring.io/spring-data/rest/docs/current/reference/html/</a:t>
+            </a:r>
+          </a:p>
+          <a:p>
+            <a:endParaRPr lang="en-GB" dirty="0"/>
           </a:p>
         </p:txBody>
       </p:sp>
     </p:spTree>
     <p:extLst>
       <p:ext uri="{BB962C8B-B14F-4D97-AF65-F5344CB8AC3E}">
-        <p14:creationId xmlns:p14="http://schemas.microsoft.com/office/powerpoint/2010/main" val="1832731950"/>
+        <p14:creationId xmlns:p14="http://schemas.microsoft.com/office/powerpoint/2010/main" val="1815258435"/>
       </p:ext>
     </p:extLst>
   </p:cSld>
@@ -8704,8 +8454,8 @@
           <a:lstStyle/>
           <a:p>
             <a:r>
-              <a:rPr lang="de-DE" dirty="0"/>
-              <a:t>15 min</a:t>
+              <a:rPr lang="en-US" dirty="0"/>
+              <a:t>30 min</a:t>
             </a:r>
             <a:endParaRPr lang="en-GB" dirty="0"/>
           </a:p>
@@ -8770,12 +8520,22 @@
         </p:nvSpPr>
         <p:spPr/>
         <p:txBody>
-          <a:bodyPr/>
-          <a:lstStyle/>
-          <a:p>
-            <a:r>
-              <a:rPr lang="de-DE" dirty="0"/>
-              <a:t>Spring Data Theorie</a:t>
+          <a:bodyPr>
+            <a:normAutofit/>
+          </a:bodyPr>
+          <a:lstStyle/>
+          <a:p>
+            <a:r>
+              <a:rPr lang="de-DE" dirty="0"/>
+              <a:t>Event Repository </a:t>
+            </a:r>
+            <a:r>
+              <a:rPr lang="de-DE" dirty="0" err="1"/>
+              <a:t>erweiten</a:t>
+            </a:r>
+            <a:r>
+              <a:rPr lang="de-DE" dirty="0"/>
+              <a:t> um Suche</a:t>
             </a:r>
             <a:endParaRPr lang="en-GB" dirty="0"/>
           </a:p>
@@ -8798,82 +8558,16 @@
           <a:p>
             <a:r>
               <a:rPr lang="de-DE" dirty="0"/>
-              <a:t>Query </a:t>
-            </a:r>
-            <a:r>
-              <a:rPr lang="de-DE" dirty="0" err="1"/>
-              <a:t>syntax</a:t>
-            </a:r>
-            <a:r>
-              <a:rPr lang="de-DE" dirty="0"/>
-              <a:t> (IDE Unterstützung, </a:t>
-            </a:r>
-            <a:r>
-              <a:rPr lang="de-DE" dirty="0" err="1"/>
-              <a:t>IntelliJ</a:t>
-            </a:r>
-            <a:r>
-              <a:rPr lang="de-DE" dirty="0"/>
-              <a:t>, )</a:t>
-            </a:r>
-          </a:p>
-          <a:p>
-            <a:r>
-              <a:rPr lang="de-DE" dirty="0" err="1"/>
-              <a:t>Repositories</a:t>
-            </a:r>
-            <a:r>
-              <a:rPr lang="de-DE" dirty="0"/>
-              <a:t> (CRUD, </a:t>
-            </a:r>
-            <a:r>
-              <a:rPr lang="de-DE" dirty="0" err="1"/>
-              <a:t>PagingAndSorting</a:t>
-            </a:r>
-            <a:r>
-              <a:rPr lang="de-DE" dirty="0"/>
-              <a:t> …)</a:t>
-            </a:r>
-          </a:p>
-          <a:p>
-            <a:r>
-              <a:rPr lang="de-DE" dirty="0"/>
-              <a:t>Request </a:t>
-            </a:r>
-            <a:r>
-              <a:rPr lang="de-DE" dirty="0" err="1"/>
-              <a:t>params</a:t>
-            </a:r>
-            <a:endParaRPr lang="de-DE" dirty="0"/>
-          </a:p>
-          <a:p>
-            <a:r>
-              <a:rPr lang="de-DE" dirty="0"/>
-              <a:t>Native </a:t>
+              <a:t>(danach HAL Browser zeigen, neue </a:t>
             </a:r>
             <a:r>
               <a:rPr lang="de-DE" dirty="0" err="1"/>
               <a:t>Queries</a:t>
             </a:r>
-            <a:endParaRPr lang="de-DE" dirty="0"/>
-          </a:p>
-          <a:p>
-            <a:endParaRPr lang="de-DE" dirty="0"/>
-          </a:p>
-          <a:p>
-            <a:pPr marL="0" indent="0">
-              <a:buNone/>
-            </a:pPr>
-            <a:r>
-              <a:rPr lang="de-DE" dirty="0" err="1"/>
-              <a:t>Documentation</a:t>
-            </a:r>
-            <a:r>
-              <a:rPr lang="de-DE" dirty="0"/>
-              <a:t>: http://docs.spring.io/spring-data/rest/docs/current/reference/html/</a:t>
-            </a:r>
-          </a:p>
-          <a:p>
+            <a:r>
+              <a:rPr lang="de-DE" dirty="0"/>
+              <a:t> da)</a:t>
+            </a:r>
             <a:endParaRPr lang="en-GB" dirty="0"/>
           </a:p>
         </p:txBody>
@@ -8881,7 +8575,7 @@
     </p:spTree>
     <p:extLst>
       <p:ext uri="{BB962C8B-B14F-4D97-AF65-F5344CB8AC3E}">
-        <p14:creationId xmlns:p14="http://schemas.microsoft.com/office/powerpoint/2010/main" val="1815258435"/>
+        <p14:creationId xmlns:p14="http://schemas.microsoft.com/office/powerpoint/2010/main" val="204088125"/>
       </p:ext>
     </p:extLst>
   </p:cSld>
@@ -10172,6 +9866,15 @@
 </file>
 
 <file path=customXml/item1.xml><?xml version="1.0" encoding="utf-8"?>
+<p:properties xmlns:p="http://schemas.microsoft.com/office/2006/metadata/properties" xmlns:xsi="http://www.w3.org/2001/XMLSchema-instance" xmlns:pc="http://schemas.microsoft.com/office/infopath/2007/PartnerControls">
+  <documentManagement>
+    <_Version xmlns="http://schemas.microsoft.com/sharepoint/v3/fields" xsi:nil="true"/>
+    <_Status xmlns="http://schemas.microsoft.com/sharepoint/v3/fields">Not Started</_Status>
+  </documentManagement>
+</p:properties>
+</file>
+
+<file path=customXml/item2.xml><?xml version="1.0" encoding="utf-8"?>
 <ct:contentTypeSchema xmlns:ct="http://schemas.microsoft.com/office/2006/metadata/contentType" xmlns:ma="http://schemas.microsoft.com/office/2006/metadata/properties/metaAttributes" ct:_="" ma:_="" ma:contentTypeName="Document" ma:contentTypeID="0x0101000DE64AEEDD9B7A4D93545ACBE97D4615" ma:contentTypeVersion="2" ma:contentTypeDescription="Create a new document." ma:contentTypeScope="" ma:versionID="f49002b78e3a4a71b814eef46a983816">
   <xsd:schema xmlns:xsd="http://www.w3.org/2001/XMLSchema" xmlns:xs="http://www.w3.org/2001/XMLSchema" xmlns:p="http://schemas.microsoft.com/office/2006/metadata/properties" xmlns:ns2="http://schemas.microsoft.com/sharepoint/v3/fields" targetNamespace="http://schemas.microsoft.com/office/2006/metadata/properties" ma:root="true" ma:fieldsID="38f6db2dd0d9a0cf6a8dc37be32b365b" ns2:_="">
     <xsd:import namespace="http://schemas.microsoft.com/sharepoint/v3/fields"/>
@@ -10315,15 +10018,6 @@
 </ct:contentTypeSchema>
 </file>
 
-<file path=customXml/item2.xml><?xml version="1.0" encoding="utf-8"?>
-<p:properties xmlns:p="http://schemas.microsoft.com/office/2006/metadata/properties" xmlns:xsi="http://www.w3.org/2001/XMLSchema-instance" xmlns:pc="http://schemas.microsoft.com/office/infopath/2007/PartnerControls">
-  <documentManagement>
-    <_Version xmlns="http://schemas.microsoft.com/sharepoint/v3/fields" xsi:nil="true"/>
-    <_Status xmlns="http://schemas.microsoft.com/sharepoint/v3/fields">Not Started</_Status>
-  </documentManagement>
-</p:properties>
-</file>
-
 <file path=customXml/item3.xml><?xml version="1.0" encoding="utf-8"?>
 <?mso-contentType ?>
 <FormTemplates xmlns="http://schemas.microsoft.com/sharepoint/v3/contenttype/forms">
@@ -10334,6 +10028,22 @@
 </file>
 
 <file path=customXml/itemProps1.xml><?xml version="1.0" encoding="utf-8"?>
+<ds:datastoreItem xmlns:ds="http://schemas.openxmlformats.org/officeDocument/2006/customXml" ds:itemID="{7B6F2769-7194-4217-93D3-3AF3A4742282}">
+  <ds:schemaRefs>
+    <ds:schemaRef ds:uri="http://schemas.microsoft.com/sharepoint/v3/fields"/>
+    <ds:schemaRef ds:uri="http://purl.org/dc/terms/"/>
+    <ds:schemaRef ds:uri="http://schemas.microsoft.com/office/2006/documentManagement/types"/>
+    <ds:schemaRef ds:uri="http://schemas.openxmlformats.org/package/2006/metadata/core-properties"/>
+    <ds:schemaRef ds:uri="http://www.w3.org/XML/1998/namespace"/>
+    <ds:schemaRef ds:uri="http://purl.org/dc/dcmitype/"/>
+    <ds:schemaRef ds:uri="http://purl.org/dc/elements/1.1/"/>
+    <ds:schemaRef ds:uri="http://schemas.microsoft.com/office/infopath/2007/PartnerControls"/>
+    <ds:schemaRef ds:uri="http://schemas.microsoft.com/office/2006/metadata/properties"/>
+  </ds:schemaRefs>
+</ds:datastoreItem>
+</file>
+
+<file path=customXml/itemProps2.xml><?xml version="1.0" encoding="utf-8"?>
 <ds:datastoreItem xmlns:ds="http://schemas.openxmlformats.org/officeDocument/2006/customXml" ds:itemID="{E4214858-785C-42F7-BE66-6D0E79395FC8}">
   <ds:schemaRefs>
     <ds:schemaRef ds:uri="http://schemas.microsoft.com/office/2006/metadata/contentType"/>
@@ -10351,22 +10061,6 @@
 </ds:datastoreItem>
 </file>
 
-<file path=customXml/itemProps2.xml><?xml version="1.0" encoding="utf-8"?>
-<ds:datastoreItem xmlns:ds="http://schemas.openxmlformats.org/officeDocument/2006/customXml" ds:itemID="{7B6F2769-7194-4217-93D3-3AF3A4742282}">
-  <ds:schemaRefs>
-    <ds:schemaRef ds:uri="http://purl.org/dc/dcmitype/"/>
-    <ds:schemaRef ds:uri="http://purl.org/dc/terms/"/>
-    <ds:schemaRef ds:uri="http://schemas.microsoft.com/office/infopath/2007/PartnerControls"/>
-    <ds:schemaRef ds:uri="http://purl.org/dc/elements/1.1/"/>
-    <ds:schemaRef ds:uri="http://schemas.microsoft.com/office/2006/documentManagement/types"/>
-    <ds:schemaRef ds:uri="http://schemas.microsoft.com/sharepoint/v3/fields"/>
-    <ds:schemaRef ds:uri="http://schemas.openxmlformats.org/package/2006/metadata/core-properties"/>
-    <ds:schemaRef ds:uri="http://schemas.microsoft.com/office/2006/metadata/properties"/>
-    <ds:schemaRef ds:uri="http://www.w3.org/XML/1998/namespace"/>
-  </ds:schemaRefs>
-</ds:datastoreItem>
-</file>
-
 <file path=customXml/itemProps3.xml><?xml version="1.0" encoding="utf-8"?>
 <ds:datastoreItem xmlns:ds="http://schemas.openxmlformats.org/officeDocument/2006/customXml" ds:itemID="{87D2A1B0-FF3E-4009-940D-AED0EB70AA20}">
   <ds:schemaRefs>

</xml_diff>